<commit_message>
Add webpoll link in the presentation slides
</commit_message>
<xml_diff>
--- a/Producer and Consumer in Java.pptx
+++ b/Producer and Consumer in Java.pptx
@@ -5306,12 +5306,8 @@
               <a:t>pthread</a:t>
             </a:r>
             <a:r>
-              <a:rPr lang="en-US"/>
-              <a:t> mutex : </a:t>
-            </a:r>
-            <a:r>
-              <a:rPr lang="en-US" dirty="0"/>
-              <a:t>https://stackoverflow.com/questions/23908711/linux-pthread-mutex-and-kernel-scheduler</a:t>
+              <a:rPr lang="en-US" dirty="0"/>
+              <a:t> mutex : https://stackoverflow.com/questions/23908711/linux-pthread-mutex-and-kernel-scheduler</a:t>
             </a:r>
           </a:p>
           <a:p>
@@ -26865,7 +26861,15 @@
           <a:p>
             <a:r>
               <a:rPr lang="en-US" dirty="0"/>
-              <a:t>Monitor has a special bias lock mechanism</a:t>
+              <a:t>Monitor has a special bias lock, adaptive </a:t>
+            </a:r>
+            <a:r>
+              <a:rPr lang="en-US" dirty="0" err="1"/>
+              <a:t>spining</a:t>
+            </a:r>
+            <a:r>
+              <a:rPr lang="en-US" dirty="0"/>
+              <a:t> mechanism</a:t>
             </a:r>
           </a:p>
           <a:p>
@@ -28075,9 +28079,12 @@
           <a:p>
             <a:pPr lvl="1"/>
             <a:r>
-              <a:rPr lang="en-US" dirty="0"/>
-              <a:t>http://webpoll.rnd.ericsson.se/poll.asp?ID=xxx</a:t>
-            </a:r>
+              <a:rPr lang="en-US" u="sng" dirty="0">
+                <a:hlinkClick r:id="rId3"/>
+              </a:rPr>
+              <a:t>http://webpoll.rnd.ericsson.se/poll.asp?ID=142841</a:t>
+            </a:r>
+            <a:endParaRPr lang="en-US" dirty="0"/>
           </a:p>
           <a:p>
             <a:pPr lvl="1"/>

</xml_diff>

<commit_message>
fix a bug in nio shm example and a few update in the slides
</commit_message>
<xml_diff>
--- a/Producer and Consumer in Java.pptx
+++ b/Producer and Consumer in Java.pptx
@@ -28533,7 +28533,7 @@
         </p:blipFill>
         <p:spPr>
           <a:xfrm>
-            <a:off x="415024" y="1392929"/>
+            <a:off x="415024" y="1195387"/>
             <a:ext cx="11229975" cy="4467225"/>
           </a:xfrm>
           <a:prstGeom prst="rect">
@@ -28576,6 +28576,43 @@
               </a:rPr>
               <a:t>Java Thread State Figure </a:t>
             </a:r>
+          </a:p>
+        </p:txBody>
+      </p:sp>
+      <p:sp>
+        <p:nvSpPr>
+          <p:cNvPr id="3" name="Rectangle 2">
+            <a:extLst>
+              <a:ext uri="{FF2B5EF4-FFF2-40B4-BE49-F238E27FC236}">
+                <a16:creationId xmlns:a16="http://schemas.microsoft.com/office/drawing/2014/main" id="{33FD2FFB-26FA-4481-A8AA-4D40B1BD377D}"/>
+              </a:ext>
+            </a:extLst>
+          </p:cNvPr>
+          <p:cNvSpPr/>
+          <p:nvPr/>
+        </p:nvSpPr>
+        <p:spPr>
+          <a:xfrm>
+            <a:off x="548365" y="6066697"/>
+            <a:ext cx="11805285" cy="276999"/>
+          </a:xfrm>
+          <a:prstGeom prst="rect">
+            <a:avLst/>
+          </a:prstGeom>
+        </p:spPr>
+        <p:txBody>
+          <a:bodyPr wrap="square">
+            <a:spAutoFit/>
+          </a:bodyPr>
+          <a:lstStyle/>
+          <a:p>
+            <a:r>
+              <a:rPr lang="en-US" sz="1200" dirty="0">
+                <a:hlinkClick r:id="rId4" action="ppaction://hlinkfile"/>
+              </a:rPr>
+              <a:t>\\bjg.cn.ao.ericsson.se\X$\DUIB_China\XI\XIT\XIT_All\XIT_Java_Instructor_Committee\20180803_Concurrent_Programming_By_Xiaohan_and_Ningning</a:t>
+            </a:r>
+            <a:endParaRPr lang="en-US" sz="1200" dirty="0"/>
           </a:p>
         </p:txBody>
       </p:sp>

</xml_diff>